<commit_message>
clean and annotate lockdown plot scripts
</commit_message>
<xml_diff>
--- a/lockdown/fig/death_kl_combined.pptx
+++ b/lockdown/fig/death_kl_combined.pptx
@@ -104,6 +104,11 @@
       </a:defRPr>
     </a:lvl9pPr>
   </p:defaultTextStyle>
+  <p:extLst>
+    <p:ext uri="{EFAFB233-063F-42B5-8137-9DF3F51BA10A}">
+      <p15:sldGuideLst xmlns:p15="http://schemas.microsoft.com/office/powerpoint/2012/main"/>
+    </p:ext>
+  </p:extLst>
 </p:presentation>
 </file>
 
@@ -2968,10 +2973,10 @@
       </p:grpSpPr>
       <p:pic>
         <p:nvPicPr>
-          <p:cNvPr id="5" name="Picture 4">
+          <p:cNvPr id="3" name="Picture 2">
             <a:extLst>
               <a:ext uri="{FF2B5EF4-FFF2-40B4-BE49-F238E27FC236}">
-                <a16:creationId xmlns:a16="http://schemas.microsoft.com/office/drawing/2014/main" id="{596FC3B0-C1AF-2F41-BD9E-91F731C1CF3A}"/>
+                <a16:creationId xmlns:a16="http://schemas.microsoft.com/office/drawing/2014/main" id="{6F668045-784F-464C-B2F4-C1618A441E85}"/>
               </a:ext>
             </a:extLst>
           </p:cNvPr>
@@ -2988,7 +2993,7 @@
         </p:blipFill>
         <p:spPr>
           <a:xfrm>
-            <a:off x="0" y="0"/>
+            <a:off x="0" y="5029200"/>
             <a:ext cx="10058400" cy="5029200"/>
           </a:xfrm>
           <a:prstGeom prst="rect">
@@ -2998,10 +3003,10 @@
       </p:pic>
       <p:pic>
         <p:nvPicPr>
-          <p:cNvPr id="7" name="Picture 6">
+          <p:cNvPr id="5" name="Picture 4">
             <a:extLst>
               <a:ext uri="{FF2B5EF4-FFF2-40B4-BE49-F238E27FC236}">
-                <a16:creationId xmlns:a16="http://schemas.microsoft.com/office/drawing/2014/main" id="{CB5BF6EC-2A15-9E42-9F19-FB5157BF214D}"/>
+                <a16:creationId xmlns:a16="http://schemas.microsoft.com/office/drawing/2014/main" id="{596FC3B0-C1AF-2F41-BD9E-91F731C1CF3A}"/>
               </a:ext>
             </a:extLst>
           </p:cNvPr>
@@ -3018,7 +3023,7 @@
         </p:blipFill>
         <p:spPr>
           <a:xfrm>
-            <a:off x="0" y="5029200"/>
+            <a:off x="0" y="0"/>
             <a:ext cx="10058400" cy="5029200"/>
           </a:xfrm>
           <a:prstGeom prst="rect">

</xml_diff>